<commit_message>
Update Revised Capstone Presentation.pptx
</commit_message>
<xml_diff>
--- a/Revised Capstone Presentation.pptx
+++ b/Revised Capstone Presentation.pptx
@@ -121,6 +121,11 @@
       </a:defRPr>
     </a:lvl9pPr>
   </p:defaultTextStyle>
+  <p:extLst>
+    <p:ext uri="{EFAFB233-063F-42B5-8137-9DF3F51BA10A}">
+      <p15:sldGuideLst xmlns:p15="http://schemas.microsoft.com/office/powerpoint/2012/main"/>
+    </p:ext>
+  </p:extLst>
 </p:presentation>
 </file>
 
@@ -14005,7 +14010,23 @@
             </a:pPr>
             <a:r>
               <a:rPr lang="en-US" sz="2400" dirty="0"/>
-              <a:t>Create tool to validate if keyboard is working or not.</a:t>
+              <a:t>Create tool to validate if keyboard is </a:t>
+            </a:r>
+            <a:r>
+              <a:rPr lang="en-US" sz="2400" b="1" i="1" dirty="0"/>
+              <a:t>working</a:t>
+            </a:r>
+            <a:r>
+              <a:rPr lang="en-US" sz="2400" dirty="0"/>
+              <a:t> or </a:t>
+            </a:r>
+            <a:r>
+              <a:rPr lang="en-US" sz="2400" b="1" i="1" dirty="0"/>
+              <a:t>not working</a:t>
+            </a:r>
+            <a:r>
+              <a:rPr lang="en-US" sz="2400" dirty="0"/>
+              <a:t>.</a:t>
             </a:r>
           </a:p>
         </p:txBody>
@@ -14094,11 +14115,10 @@
           </a:bodyPr>
           <a:lstStyle/>
           <a:p>
-            <a:pPr marL="0" indent="0">
+            <a:pPr>
               <a:lnSpc>
                 <a:spcPct val="150000"/>
               </a:lnSpc>
-              <a:buNone/>
             </a:pPr>
             <a:r>
               <a:rPr lang="en-US" sz="2400" dirty="0"/>
@@ -14106,11 +14126,10 @@
             </a:r>
           </a:p>
           <a:p>
-            <a:pPr marL="0" indent="0">
+            <a:pPr>
               <a:lnSpc>
                 <a:spcPct val="150000"/>
               </a:lnSpc>
-              <a:buNone/>
             </a:pPr>
             <a:r>
               <a:rPr lang="en-US" sz="2400" dirty="0"/>
@@ -14118,11 +14137,10 @@
             </a:r>
           </a:p>
           <a:p>
-            <a:pPr marL="0" indent="0">
+            <a:pPr>
               <a:lnSpc>
                 <a:spcPct val="150000"/>
               </a:lnSpc>
-              <a:buNone/>
             </a:pPr>
             <a:endParaRPr lang="en-US" sz="2400" dirty="0"/>
           </a:p>

</xml_diff>

<commit_message>
fix bug in driver.py
</commit_message>
<xml_diff>
--- a/Revised Capstone Presentation.pptx
+++ b/Revised Capstone Presentation.pptx
@@ -15938,13 +15938,8 @@
           <a:p>
             <a:r>
               <a:rPr lang="en-US" dirty="0"/>
-              <a:t>Technology used (w/o </a:t>
-            </a:r>
-            <a:r>
-              <a:rPr lang="en-US"/>
-              <a:t>xfer learning) </a:t>
-            </a:r>
-            <a:endParaRPr lang="en-US" dirty="0"/>
+              <a:t>Technology used (w/o xfer learning) </a:t>
+            </a:r>
           </a:p>
         </p:txBody>
       </p:sp>

</xml_diff>